<commit_message>
Adding files via upload
</commit_message>
<xml_diff>
--- a/LINKED LIST.pptx
+++ b/LINKED LIST.pptx
@@ -25,6 +25,12 @@
     <p:sldId id="273" r:id="rId19"/>
     <p:sldId id="274" r:id="rId20"/>
     <p:sldId id="275" r:id="rId21"/>
+    <p:sldId id="276" r:id="rId22"/>
+    <p:sldId id="280" r:id="rId23"/>
+    <p:sldId id="277" r:id="rId24"/>
+    <p:sldId id="278" r:id="rId25"/>
+    <p:sldId id="279" r:id="rId26"/>
+    <p:sldId id="281" r:id="rId27"/>
   </p:sldIdLst>
   <p:sldSz cx="12192000" cy="6858000"/>
   <p:notesSz cx="6858000" cy="9144000"/>
@@ -262,7 +268,7 @@
           <a:p>
             <a:fld id="{70BD2CF8-0400-4A99-8371-645D9024D749}" type="datetimeFigureOut">
               <a:rPr lang="en-IN" smtClean="0"/>
-              <a:t>25-10-2021</a:t>
+              <a:t>27-10-2021</a:t>
             </a:fld>
             <a:endParaRPr lang="en-IN"/>
           </a:p>
@@ -432,7 +438,7 @@
           <a:p>
             <a:fld id="{70BD2CF8-0400-4A99-8371-645D9024D749}" type="datetimeFigureOut">
               <a:rPr lang="en-IN" smtClean="0"/>
-              <a:t>25-10-2021</a:t>
+              <a:t>27-10-2021</a:t>
             </a:fld>
             <a:endParaRPr lang="en-IN"/>
           </a:p>
@@ -612,7 +618,7 @@
           <a:p>
             <a:fld id="{70BD2CF8-0400-4A99-8371-645D9024D749}" type="datetimeFigureOut">
               <a:rPr lang="en-IN" smtClean="0"/>
-              <a:t>25-10-2021</a:t>
+              <a:t>27-10-2021</a:t>
             </a:fld>
             <a:endParaRPr lang="en-IN"/>
           </a:p>
@@ -782,7 +788,7 @@
           <a:p>
             <a:fld id="{70BD2CF8-0400-4A99-8371-645D9024D749}" type="datetimeFigureOut">
               <a:rPr lang="en-IN" smtClean="0"/>
-              <a:t>25-10-2021</a:t>
+              <a:t>27-10-2021</a:t>
             </a:fld>
             <a:endParaRPr lang="en-IN"/>
           </a:p>
@@ -1028,7 +1034,7 @@
           <a:p>
             <a:fld id="{70BD2CF8-0400-4A99-8371-645D9024D749}" type="datetimeFigureOut">
               <a:rPr lang="en-IN" smtClean="0"/>
-              <a:t>25-10-2021</a:t>
+              <a:t>27-10-2021</a:t>
             </a:fld>
             <a:endParaRPr lang="en-IN"/>
           </a:p>
@@ -1260,7 +1266,7 @@
           <a:p>
             <a:fld id="{70BD2CF8-0400-4A99-8371-645D9024D749}" type="datetimeFigureOut">
               <a:rPr lang="en-IN" smtClean="0"/>
-              <a:t>25-10-2021</a:t>
+              <a:t>27-10-2021</a:t>
             </a:fld>
             <a:endParaRPr lang="en-IN"/>
           </a:p>
@@ -1627,7 +1633,7 @@
           <a:p>
             <a:fld id="{70BD2CF8-0400-4A99-8371-645D9024D749}" type="datetimeFigureOut">
               <a:rPr lang="en-IN" smtClean="0"/>
-              <a:t>25-10-2021</a:t>
+              <a:t>27-10-2021</a:t>
             </a:fld>
             <a:endParaRPr lang="en-IN"/>
           </a:p>
@@ -1745,7 +1751,7 @@
           <a:p>
             <a:fld id="{70BD2CF8-0400-4A99-8371-645D9024D749}" type="datetimeFigureOut">
               <a:rPr lang="en-IN" smtClean="0"/>
-              <a:t>25-10-2021</a:t>
+              <a:t>27-10-2021</a:t>
             </a:fld>
             <a:endParaRPr lang="en-IN"/>
           </a:p>
@@ -1840,7 +1846,7 @@
           <a:p>
             <a:fld id="{70BD2CF8-0400-4A99-8371-645D9024D749}" type="datetimeFigureOut">
               <a:rPr lang="en-IN" smtClean="0"/>
-              <a:t>25-10-2021</a:t>
+              <a:t>27-10-2021</a:t>
             </a:fld>
             <a:endParaRPr lang="en-IN"/>
           </a:p>
@@ -2117,7 +2123,7 @@
           <a:p>
             <a:fld id="{70BD2CF8-0400-4A99-8371-645D9024D749}" type="datetimeFigureOut">
               <a:rPr lang="en-IN" smtClean="0"/>
-              <a:t>25-10-2021</a:t>
+              <a:t>27-10-2021</a:t>
             </a:fld>
             <a:endParaRPr lang="en-IN"/>
           </a:p>
@@ -2370,7 +2376,7 @@
           <a:p>
             <a:fld id="{70BD2CF8-0400-4A99-8371-645D9024D749}" type="datetimeFigureOut">
               <a:rPr lang="en-IN" smtClean="0"/>
-              <a:t>25-10-2021</a:t>
+              <a:t>27-10-2021</a:t>
             </a:fld>
             <a:endParaRPr lang="en-IN"/>
           </a:p>
@@ -2583,7 +2589,7 @@
           <a:p>
             <a:fld id="{70BD2CF8-0400-4A99-8371-645D9024D749}" type="datetimeFigureOut">
               <a:rPr lang="en-IN" smtClean="0"/>
-              <a:t>25-10-2021</a:t>
+              <a:t>27-10-2021</a:t>
             </a:fld>
             <a:endParaRPr lang="en-IN"/>
           </a:p>
@@ -3916,6 +3922,584 @@
   <p:clrMapOvr>
     <a:masterClrMapping/>
   </p:clrMapOvr>
+  <p:timing>
+    <p:tnLst>
+      <p:par>
+        <p:cTn id="1" dur="indefinite" restart="never" nodeType="tmRoot"/>
+      </p:par>
+    </p:tnLst>
+  </p:timing>
+</p:sld>
+</file>
+
+<file path=ppt/slides/slide21.xml><?xml version="1.0" encoding="utf-8"?>
+<p:sld xmlns:a="http://schemas.openxmlformats.org/drawingml/2006/main" xmlns:r="http://schemas.openxmlformats.org/officeDocument/2006/relationships" xmlns:p="http://schemas.openxmlformats.org/presentationml/2006/main">
+  <p:cSld>
+    <p:spTree>
+      <p:nvGrpSpPr>
+        <p:cNvPr id="1" name=""/>
+        <p:cNvGrpSpPr/>
+        <p:nvPr/>
+      </p:nvGrpSpPr>
+      <p:grpSpPr>
+        <a:xfrm>
+          <a:off x="0" y="0"/>
+          <a:ext cx="0" cy="0"/>
+          <a:chOff x="0" y="0"/>
+          <a:chExt cx="0" cy="0"/>
+        </a:xfrm>
+      </p:grpSpPr>
+      <p:pic>
+        <p:nvPicPr>
+          <p:cNvPr id="1026" name="Picture 2" descr="doubly linked list diagram"/>
+          <p:cNvPicPr>
+            <a:picLocks noChangeAspect="1" noChangeArrowheads="1"/>
+          </p:cNvPicPr>
+          <p:nvPr/>
+        </p:nvPicPr>
+        <p:blipFill>
+          <a:blip r:embed="rId2">
+            <a:extLst>
+              <a:ext uri="{28A0092B-C50C-407E-A947-70E740481C1C}">
+                <a14:useLocalDpi xmlns:a14="http://schemas.microsoft.com/office/drawing/2010/main" val="0"/>
+              </a:ext>
+            </a:extLst>
+          </a:blip>
+          <a:srcRect/>
+          <a:stretch>
+            <a:fillRect/>
+          </a:stretch>
+        </p:blipFill>
+        <p:spPr bwMode="auto">
+          <a:xfrm>
+            <a:off x="1368028" y="3692481"/>
+            <a:ext cx="9070340" cy="2244680"/>
+          </a:xfrm>
+          <a:prstGeom prst="rect">
+            <a:avLst/>
+          </a:prstGeom>
+          <a:noFill/>
+          <a:extLst>
+            <a:ext uri="{909E8E84-426E-40DD-AFC4-6F175D3DCCD1}">
+              <a14:hiddenFill xmlns:a14="http://schemas.microsoft.com/office/drawing/2010/main">
+                <a:solidFill>
+                  <a:srgbClr val="FFFFFF"/>
+                </a:solidFill>
+              </a14:hiddenFill>
+            </a:ext>
+          </a:extLst>
+        </p:spPr>
+      </p:pic>
+      <p:sp>
+        <p:nvSpPr>
+          <p:cNvPr id="3" name="Title 2"/>
+          <p:cNvSpPr>
+            <a:spLocks noGrp="1"/>
+          </p:cNvSpPr>
+          <p:nvPr>
+            <p:ph type="title"/>
+          </p:nvPr>
+        </p:nvSpPr>
+        <p:spPr/>
+        <p:txBody>
+          <a:bodyPr/>
+          <a:lstStyle/>
+          <a:p>
+            <a:r>
+              <a:rPr lang="en-IN" dirty="0" smtClean="0"/>
+              <a:t>Doubly Linked List</a:t>
+            </a:r>
+            <a:endParaRPr lang="en-IN" dirty="0"/>
+          </a:p>
+        </p:txBody>
+      </p:sp>
+    </p:spTree>
+    <p:extLst>
+      <p:ext uri="{BB962C8B-B14F-4D97-AF65-F5344CB8AC3E}">
+        <p14:creationId xmlns:p14="http://schemas.microsoft.com/office/powerpoint/2010/main" val="2886700482"/>
+      </p:ext>
+    </p:extLst>
+  </p:cSld>
+  <p:clrMapOvr>
+    <a:masterClrMapping/>
+  </p:clrMapOvr>
+  <p:timing>
+    <p:tnLst>
+      <p:par>
+        <p:cTn id="1" dur="indefinite" restart="never" nodeType="tmRoot"/>
+      </p:par>
+    </p:tnLst>
+  </p:timing>
+</p:sld>
+</file>
+
+<file path=ppt/slides/slide22.xml><?xml version="1.0" encoding="utf-8"?>
+<p:sld xmlns:a="http://schemas.openxmlformats.org/drawingml/2006/main" xmlns:r="http://schemas.openxmlformats.org/officeDocument/2006/relationships" xmlns:p="http://schemas.openxmlformats.org/presentationml/2006/main">
+  <p:cSld>
+    <p:spTree>
+      <p:nvGrpSpPr>
+        <p:cNvPr id="1" name=""/>
+        <p:cNvGrpSpPr/>
+        <p:nvPr/>
+      </p:nvGrpSpPr>
+      <p:grpSpPr>
+        <a:xfrm>
+          <a:off x="0" y="0"/>
+          <a:ext cx="0" cy="0"/>
+          <a:chOff x="0" y="0"/>
+          <a:chExt cx="0" cy="0"/>
+        </a:xfrm>
+      </p:grpSpPr>
+      <p:pic>
+        <p:nvPicPr>
+          <p:cNvPr id="1026" name="Picture 2" descr="Doubly Linked list&#10;Advantages&#10;1. We can traverse in&#10;both directions i.e. from&#10;starting to end and as&#10;well as from end to&#10;s..."/>
+          <p:cNvPicPr>
+            <a:picLocks noChangeAspect="1" noChangeArrowheads="1"/>
+          </p:cNvPicPr>
+          <p:nvPr/>
+        </p:nvPicPr>
+        <p:blipFill>
+          <a:blip r:embed="rId2">
+            <a:extLst>
+              <a:ext uri="{28A0092B-C50C-407E-A947-70E740481C1C}">
+                <a14:useLocalDpi xmlns:a14="http://schemas.microsoft.com/office/drawing/2010/main" val="0"/>
+              </a:ext>
+            </a:extLst>
+          </a:blip>
+          <a:srcRect/>
+          <a:stretch>
+            <a:fillRect/>
+          </a:stretch>
+        </p:blipFill>
+        <p:spPr bwMode="auto">
+          <a:xfrm>
+            <a:off x="1893194" y="621606"/>
+            <a:ext cx="7727323" cy="5801549"/>
+          </a:xfrm>
+          <a:prstGeom prst="rect">
+            <a:avLst/>
+          </a:prstGeom>
+          <a:noFill/>
+          <a:extLst>
+            <a:ext uri="{909E8E84-426E-40DD-AFC4-6F175D3DCCD1}">
+              <a14:hiddenFill xmlns:a14="http://schemas.microsoft.com/office/drawing/2010/main">
+                <a:solidFill>
+                  <a:srgbClr val="FFFFFF"/>
+                </a:solidFill>
+              </a14:hiddenFill>
+            </a:ext>
+          </a:extLst>
+        </p:spPr>
+      </p:pic>
+    </p:spTree>
+    <p:extLst>
+      <p:ext uri="{BB962C8B-B14F-4D97-AF65-F5344CB8AC3E}">
+        <p14:creationId xmlns:p14="http://schemas.microsoft.com/office/powerpoint/2010/main" val="1643662931"/>
+      </p:ext>
+    </p:extLst>
+  </p:cSld>
+  <p:clrMapOvr>
+    <a:masterClrMapping/>
+  </p:clrMapOvr>
+  <p:timing>
+    <p:tnLst>
+      <p:par>
+        <p:cTn id="1" dur="indefinite" restart="never" nodeType="tmRoot"/>
+      </p:par>
+    </p:tnLst>
+  </p:timing>
+</p:sld>
+</file>
+
+<file path=ppt/slides/slide23.xml><?xml version="1.0" encoding="utf-8"?>
+<p:sld xmlns:a="http://schemas.openxmlformats.org/drawingml/2006/main" xmlns:r="http://schemas.openxmlformats.org/officeDocument/2006/relationships" xmlns:p="http://schemas.openxmlformats.org/presentationml/2006/main">
+  <p:cSld>
+    <p:spTree>
+      <p:nvGrpSpPr>
+        <p:cNvPr id="1" name=""/>
+        <p:cNvGrpSpPr/>
+        <p:nvPr/>
+      </p:nvGrpSpPr>
+      <p:grpSpPr>
+        <a:xfrm>
+          <a:off x="0" y="0"/>
+          <a:ext cx="0" cy="0"/>
+          <a:chOff x="0" y="0"/>
+          <a:chExt cx="0" cy="0"/>
+        </a:xfrm>
+      </p:grpSpPr>
+      <p:sp>
+        <p:nvSpPr>
+          <p:cNvPr id="2" name="Title 1"/>
+          <p:cNvSpPr>
+            <a:spLocks noGrp="1"/>
+          </p:cNvSpPr>
+          <p:nvPr>
+            <p:ph type="title"/>
+          </p:nvPr>
+        </p:nvSpPr>
+        <p:spPr/>
+        <p:txBody>
+          <a:bodyPr/>
+          <a:lstStyle/>
+          <a:p>
+            <a:r>
+              <a:rPr lang="en-IN" dirty="0" smtClean="0"/>
+              <a:t>Insert at Beginning</a:t>
+            </a:r>
+            <a:endParaRPr lang="en-IN" dirty="0"/>
+          </a:p>
+        </p:txBody>
+      </p:sp>
+      <p:pic>
+        <p:nvPicPr>
+          <p:cNvPr id="2050" name="Picture 2" descr="dll_add_front"/>
+          <p:cNvPicPr>
+            <a:picLocks noChangeAspect="1" noChangeArrowheads="1"/>
+          </p:cNvPicPr>
+          <p:nvPr/>
+        </p:nvPicPr>
+        <p:blipFill>
+          <a:blip r:embed="rId2">
+            <a:extLst>
+              <a:ext uri="{28A0092B-C50C-407E-A947-70E740481C1C}">
+                <a14:useLocalDpi xmlns:a14="http://schemas.microsoft.com/office/drawing/2010/main" val="0"/>
+              </a:ext>
+            </a:extLst>
+          </a:blip>
+          <a:srcRect/>
+          <a:stretch>
+            <a:fillRect/>
+          </a:stretch>
+        </p:blipFill>
+        <p:spPr bwMode="auto">
+          <a:xfrm>
+            <a:off x="914400" y="2644350"/>
+            <a:ext cx="10439400" cy="3238501"/>
+          </a:xfrm>
+          <a:prstGeom prst="rect">
+            <a:avLst/>
+          </a:prstGeom>
+          <a:noFill/>
+          <a:extLst>
+            <a:ext uri="{909E8E84-426E-40DD-AFC4-6F175D3DCCD1}">
+              <a14:hiddenFill xmlns:a14="http://schemas.microsoft.com/office/drawing/2010/main">
+                <a:solidFill>
+                  <a:srgbClr val="FFFFFF"/>
+                </a:solidFill>
+              </a14:hiddenFill>
+            </a:ext>
+          </a:extLst>
+        </p:spPr>
+      </p:pic>
+    </p:spTree>
+    <p:extLst>
+      <p:ext uri="{BB962C8B-B14F-4D97-AF65-F5344CB8AC3E}">
+        <p14:creationId xmlns:p14="http://schemas.microsoft.com/office/powerpoint/2010/main" val="1647394362"/>
+      </p:ext>
+    </p:extLst>
+  </p:cSld>
+  <p:clrMapOvr>
+    <a:masterClrMapping/>
+  </p:clrMapOvr>
+  <p:timing>
+    <p:tnLst>
+      <p:par>
+        <p:cTn id="1" dur="indefinite" restart="never" nodeType="tmRoot"/>
+      </p:par>
+    </p:tnLst>
+  </p:timing>
+</p:sld>
+</file>
+
+<file path=ppt/slides/slide24.xml><?xml version="1.0" encoding="utf-8"?>
+<p:sld xmlns:a="http://schemas.openxmlformats.org/drawingml/2006/main" xmlns:r="http://schemas.openxmlformats.org/officeDocument/2006/relationships" xmlns:p="http://schemas.openxmlformats.org/presentationml/2006/main">
+  <p:cSld>
+    <p:spTree>
+      <p:nvGrpSpPr>
+        <p:cNvPr id="1" name=""/>
+        <p:cNvGrpSpPr/>
+        <p:nvPr/>
+      </p:nvGrpSpPr>
+      <p:grpSpPr>
+        <a:xfrm>
+          <a:off x="0" y="0"/>
+          <a:ext cx="0" cy="0"/>
+          <a:chOff x="0" y="0"/>
+          <a:chExt cx="0" cy="0"/>
+        </a:xfrm>
+      </p:grpSpPr>
+      <p:sp>
+        <p:nvSpPr>
+          <p:cNvPr id="2" name="Title 1"/>
+          <p:cNvSpPr>
+            <a:spLocks noGrp="1"/>
+          </p:cNvSpPr>
+          <p:nvPr>
+            <p:ph type="title"/>
+          </p:nvPr>
+        </p:nvSpPr>
+        <p:spPr/>
+        <p:txBody>
+          <a:bodyPr/>
+          <a:lstStyle/>
+          <a:p>
+            <a:r>
+              <a:rPr lang="en-IN" dirty="0" smtClean="0"/>
+              <a:t>Insert after a given node</a:t>
+            </a:r>
+            <a:endParaRPr lang="en-IN" dirty="0"/>
+          </a:p>
+        </p:txBody>
+      </p:sp>
+      <p:pic>
+        <p:nvPicPr>
+          <p:cNvPr id="2050" name="Picture 2" descr="dll_add_middle"/>
+          <p:cNvPicPr>
+            <a:picLocks noChangeAspect="1" noChangeArrowheads="1"/>
+          </p:cNvPicPr>
+          <p:nvPr/>
+        </p:nvPicPr>
+        <p:blipFill>
+          <a:blip r:embed="rId2">
+            <a:extLst>
+              <a:ext uri="{28A0092B-C50C-407E-A947-70E740481C1C}">
+                <a14:useLocalDpi xmlns:a14="http://schemas.microsoft.com/office/drawing/2010/main" val="0"/>
+              </a:ext>
+            </a:extLst>
+          </a:blip>
+          <a:srcRect/>
+          <a:stretch>
+            <a:fillRect/>
+          </a:stretch>
+        </p:blipFill>
+        <p:spPr bwMode="auto">
+          <a:xfrm>
+            <a:off x="1365630" y="2745235"/>
+            <a:ext cx="9744075" cy="2924176"/>
+          </a:xfrm>
+          <a:prstGeom prst="rect">
+            <a:avLst/>
+          </a:prstGeom>
+          <a:noFill/>
+          <a:extLst>
+            <a:ext uri="{909E8E84-426E-40DD-AFC4-6F175D3DCCD1}">
+              <a14:hiddenFill xmlns:a14="http://schemas.microsoft.com/office/drawing/2010/main">
+                <a:solidFill>
+                  <a:srgbClr val="FFFFFF"/>
+                </a:solidFill>
+              </a14:hiddenFill>
+            </a:ext>
+          </a:extLst>
+        </p:spPr>
+      </p:pic>
+    </p:spTree>
+    <p:extLst>
+      <p:ext uri="{BB962C8B-B14F-4D97-AF65-F5344CB8AC3E}">
+        <p14:creationId xmlns:p14="http://schemas.microsoft.com/office/powerpoint/2010/main" val="1136432184"/>
+      </p:ext>
+    </p:extLst>
+  </p:cSld>
+  <p:clrMapOvr>
+    <a:masterClrMapping/>
+  </p:clrMapOvr>
+  <p:timing>
+    <p:tnLst>
+      <p:par>
+        <p:cTn id="1" dur="indefinite" restart="never" nodeType="tmRoot"/>
+      </p:par>
+    </p:tnLst>
+  </p:timing>
+</p:sld>
+</file>
+
+<file path=ppt/slides/slide25.xml><?xml version="1.0" encoding="utf-8"?>
+<p:sld xmlns:a="http://schemas.openxmlformats.org/drawingml/2006/main" xmlns:r="http://schemas.openxmlformats.org/officeDocument/2006/relationships" xmlns:p="http://schemas.openxmlformats.org/presentationml/2006/main">
+  <p:cSld>
+    <p:spTree>
+      <p:nvGrpSpPr>
+        <p:cNvPr id="1" name=""/>
+        <p:cNvGrpSpPr/>
+        <p:nvPr/>
+      </p:nvGrpSpPr>
+      <p:grpSpPr>
+        <a:xfrm>
+          <a:off x="0" y="0"/>
+          <a:ext cx="0" cy="0"/>
+          <a:chOff x="0" y="0"/>
+          <a:chExt cx="0" cy="0"/>
+        </a:xfrm>
+      </p:grpSpPr>
+      <p:sp>
+        <p:nvSpPr>
+          <p:cNvPr id="2" name="Title 1"/>
+          <p:cNvSpPr>
+            <a:spLocks noGrp="1"/>
+          </p:cNvSpPr>
+          <p:nvPr>
+            <p:ph type="title"/>
+          </p:nvPr>
+        </p:nvSpPr>
+        <p:spPr/>
+        <p:txBody>
+          <a:bodyPr/>
+          <a:lstStyle/>
+          <a:p>
+            <a:r>
+              <a:rPr lang="en-IN" dirty="0" smtClean="0"/>
+              <a:t>Insert at the end</a:t>
+            </a:r>
+            <a:endParaRPr lang="en-IN" dirty="0"/>
+          </a:p>
+        </p:txBody>
+      </p:sp>
+      <p:pic>
+        <p:nvPicPr>
+          <p:cNvPr id="4098" name="Picture 2" descr="dll_add_end"/>
+          <p:cNvPicPr>
+            <a:picLocks noChangeAspect="1" noChangeArrowheads="1"/>
+          </p:cNvPicPr>
+          <p:nvPr/>
+        </p:nvPicPr>
+        <p:blipFill>
+          <a:blip r:embed="rId2">
+            <a:extLst>
+              <a:ext uri="{28A0092B-C50C-407E-A947-70E740481C1C}">
+                <a14:useLocalDpi xmlns:a14="http://schemas.microsoft.com/office/drawing/2010/main" val="0"/>
+              </a:ext>
+            </a:extLst>
+          </a:blip>
+          <a:srcRect/>
+          <a:stretch>
+            <a:fillRect/>
+          </a:stretch>
+        </p:blipFill>
+        <p:spPr bwMode="auto">
+          <a:xfrm>
+            <a:off x="1085850" y="2791071"/>
+            <a:ext cx="10020300" cy="2562226"/>
+          </a:xfrm>
+          <a:prstGeom prst="rect">
+            <a:avLst/>
+          </a:prstGeom>
+          <a:noFill/>
+          <a:extLst>
+            <a:ext uri="{909E8E84-426E-40DD-AFC4-6F175D3DCCD1}">
+              <a14:hiddenFill xmlns:a14="http://schemas.microsoft.com/office/drawing/2010/main">
+                <a:solidFill>
+                  <a:srgbClr val="FFFFFF"/>
+                </a:solidFill>
+              </a14:hiddenFill>
+            </a:ext>
+          </a:extLst>
+        </p:spPr>
+      </p:pic>
+    </p:spTree>
+    <p:extLst>
+      <p:ext uri="{BB962C8B-B14F-4D97-AF65-F5344CB8AC3E}">
+        <p14:creationId xmlns:p14="http://schemas.microsoft.com/office/powerpoint/2010/main" val="375961753"/>
+      </p:ext>
+    </p:extLst>
+  </p:cSld>
+  <p:clrMapOvr>
+    <a:masterClrMapping/>
+  </p:clrMapOvr>
+  <p:timing>
+    <p:tnLst>
+      <p:par>
+        <p:cTn id="1" dur="indefinite" restart="never" nodeType="tmRoot"/>
+      </p:par>
+    </p:tnLst>
+  </p:timing>
+</p:sld>
+</file>
+
+<file path=ppt/slides/slide26.xml><?xml version="1.0" encoding="utf-8"?>
+<p:sld xmlns:a="http://schemas.openxmlformats.org/drawingml/2006/main" xmlns:r="http://schemas.openxmlformats.org/officeDocument/2006/relationships" xmlns:p="http://schemas.openxmlformats.org/presentationml/2006/main">
+  <p:cSld>
+    <p:spTree>
+      <p:nvGrpSpPr>
+        <p:cNvPr id="1" name=""/>
+        <p:cNvGrpSpPr/>
+        <p:nvPr/>
+      </p:nvGrpSpPr>
+      <p:grpSpPr>
+        <a:xfrm>
+          <a:off x="0" y="0"/>
+          <a:ext cx="0" cy="0"/>
+          <a:chOff x="0" y="0"/>
+          <a:chExt cx="0" cy="0"/>
+        </a:xfrm>
+      </p:grpSpPr>
+      <p:sp>
+        <p:nvSpPr>
+          <p:cNvPr id="2" name="Title 1"/>
+          <p:cNvSpPr>
+            <a:spLocks noGrp="1"/>
+          </p:cNvSpPr>
+          <p:nvPr>
+            <p:ph type="title"/>
+          </p:nvPr>
+        </p:nvSpPr>
+        <p:spPr/>
+        <p:txBody>
+          <a:bodyPr/>
+          <a:lstStyle/>
+          <a:p>
+            <a:r>
+              <a:rPr lang="en-IN" dirty="0" smtClean="0"/>
+              <a:t>Linked List Cycle II</a:t>
+            </a:r>
+            <a:endParaRPr lang="en-IN" dirty="0"/>
+          </a:p>
+        </p:txBody>
+      </p:sp>
+      <p:pic>
+        <p:nvPicPr>
+          <p:cNvPr id="3" name="Picture 2"/>
+          <p:cNvPicPr>
+            <a:picLocks noChangeAspect="1"/>
+          </p:cNvPicPr>
+          <p:nvPr/>
+        </p:nvPicPr>
+        <p:blipFill rotWithShape="1">
+          <a:blip r:embed="rId2" cstate="print">
+            <a:extLst>
+              <a:ext uri="{28A0092B-C50C-407E-A947-70E740481C1C}">
+                <a14:useLocalDpi xmlns:a14="http://schemas.microsoft.com/office/drawing/2010/main" val="0"/>
+              </a:ext>
+            </a:extLst>
+          </a:blip>
+          <a:srcRect l="9560" t="6919" r="15255" b="43715"/>
+          <a:stretch/>
+        </p:blipFill>
+        <p:spPr>
+          <a:xfrm rot="16200000">
+            <a:off x="3928060" y="1326525"/>
+            <a:ext cx="4327303" cy="5640942"/>
+          </a:xfrm>
+          <a:prstGeom prst="rect">
+            <a:avLst/>
+          </a:prstGeom>
+        </p:spPr>
+      </p:pic>
+    </p:spTree>
+    <p:extLst>
+      <p:ext uri="{BB962C8B-B14F-4D97-AF65-F5344CB8AC3E}">
+        <p14:creationId xmlns:p14="http://schemas.microsoft.com/office/powerpoint/2010/main" val="1251146287"/>
+      </p:ext>
+    </p:extLst>
+  </p:cSld>
+  <p:clrMapOvr>
+    <a:masterClrMapping/>
+  </p:clrMapOvr>
+  <p:timing>
+    <p:tnLst>
+      <p:par>
+        <p:cTn id="1" dur="indefinite" restart="never" nodeType="tmRoot"/>
+      </p:par>
+    </p:tnLst>
+  </p:timing>
 </p:sld>
 </file>
 

</xml_diff>